<commit_message>
Added lab 1 slides
</commit_message>
<xml_diff>
--- a/data8/slides/lab1.pptx
+++ b/data8/slides/lab1.pptx
@@ -9,21 +9,22 @@
     <p:sldMasterId id="2147483699" r:id="rId5"/>
   </p:sldMasterIdLst>
   <p:notesMasterIdLst>
-    <p:notesMasterId r:id="rId15"/>
+    <p:notesMasterId r:id="rId16"/>
   </p:notesMasterIdLst>
   <p:handoutMasterIdLst>
-    <p:handoutMasterId r:id="rId16"/>
+    <p:handoutMasterId r:id="rId17"/>
   </p:handoutMasterIdLst>
   <p:sldIdLst>
     <p:sldId id="256" r:id="rId6"/>
     <p:sldId id="261" r:id="rId7"/>
     <p:sldId id="262" r:id="rId8"/>
-    <p:sldId id="263" r:id="rId9"/>
-    <p:sldId id="265" r:id="rId10"/>
-    <p:sldId id="267" r:id="rId11"/>
-    <p:sldId id="268" r:id="rId12"/>
-    <p:sldId id="264" r:id="rId13"/>
-    <p:sldId id="266" r:id="rId14"/>
+    <p:sldId id="270" r:id="rId9"/>
+    <p:sldId id="271" r:id="rId10"/>
+    <p:sldId id="263" r:id="rId11"/>
+    <p:sldId id="265" r:id="rId12"/>
+    <p:sldId id="267" r:id="rId13"/>
+    <p:sldId id="264" r:id="rId14"/>
+    <p:sldId id="266" r:id="rId15"/>
   </p:sldIdLst>
   <p:sldSz cx="9144000" cy="6858000" type="screen4x3"/>
   <p:notesSz cx="6858000" cy="9144000"/>
@@ -207,7 +208,7 @@
           <a:p>
             <a:fld id="{97CB1905-1EEB-6545-B5E2-B70E8868255E}" type="datetimeFigureOut">
               <a:rPr lang="en-US" smtClean="0"/>
-              <a:t>7/7/2019</a:t>
+              <a:t>8/30/2019</a:t>
             </a:fld>
             <a:endParaRPr lang="en-US"/>
           </a:p>
@@ -373,7 +374,7 @@
           <a:p>
             <a:fld id="{5F53F6BF-7462-9046-A2B6-90C29244BD27}" type="datetimeFigureOut">
               <a:rPr lang="en-US" smtClean="0"/>
-              <a:t>7/7/2019</a:t>
+              <a:t>8/30/2019</a:t>
             </a:fld>
             <a:endParaRPr lang="en-US"/>
           </a:p>
@@ -7681,11 +7682,13 @@
         <p:spPr>
           <a:xfrm>
             <a:off x="685800" y="2262431"/>
-            <a:ext cx="6400800" cy="1113590"/>
+            <a:ext cx="6400800" cy="2280994"/>
           </a:xfrm>
         </p:spPr>
         <p:txBody>
-          <a:bodyPr/>
+          <a:bodyPr>
+            <a:normAutofit/>
+          </a:bodyPr>
           <a:lstStyle/>
           <a:p>
             <a:r>
@@ -7701,6 +7704,19 @@
                 <a:latin typeface="Avenir LT Std 45 Book" pitchFamily="34" charset="0"/>
               </a:rPr>
               <a:t>Fall 2019</a:t>
+            </a:r>
+          </a:p>
+          <a:p>
+            <a:endParaRPr lang="en-US" dirty="0">
+              <a:latin typeface="Avenir LT Std 45 Book" pitchFamily="34" charset="0"/>
+            </a:endParaRPr>
+          </a:p>
+          <a:p>
+            <a:r>
+              <a:rPr lang="en-US" dirty="0" smtClean="0">
+                <a:latin typeface="Avenir LT Std 45 Book" pitchFamily="34" charset="0"/>
+              </a:rPr>
+              <a:t>30 August 2019</a:t>
             </a:r>
             <a:endParaRPr lang="en-US" dirty="0">
               <a:latin typeface="Avenir LT Std 45 Book" pitchFamily="34" charset="0"/>
@@ -7712,6 +7728,104 @@
     <p:extLst>
       <p:ext uri="{BB962C8B-B14F-4D97-AF65-F5344CB8AC3E}">
         <p14:creationId xmlns:p14="http://schemas.microsoft.com/office/powerpoint/2010/main" val="1276399452"/>
+      </p:ext>
+    </p:extLst>
+  </p:cSld>
+  <p:clrMapOvr>
+    <a:masterClrMapping/>
+  </p:clrMapOvr>
+  <p:timing>
+    <p:tnLst>
+      <p:par>
+        <p:cTn id="1" dur="indefinite" restart="never" nodeType="tmRoot"/>
+      </p:par>
+    </p:tnLst>
+  </p:timing>
+</p:sld>
+</file>
+
+<file path=ppt/slides/slide10.xml><?xml version="1.0" encoding="utf-8"?>
+<p:sld xmlns:a="http://schemas.openxmlformats.org/drawingml/2006/main" xmlns:r="http://schemas.openxmlformats.org/officeDocument/2006/relationships" xmlns:p="http://schemas.openxmlformats.org/presentationml/2006/main">
+  <p:cSld>
+    <p:spTree>
+      <p:nvGrpSpPr>
+        <p:cNvPr id="1" name=""/>
+        <p:cNvGrpSpPr/>
+        <p:nvPr/>
+      </p:nvGrpSpPr>
+      <p:grpSpPr>
+        <a:xfrm>
+          <a:off x="0" y="0"/>
+          <a:ext cx="0" cy="0"/>
+          <a:chOff x="0" y="0"/>
+          <a:chExt cx="0" cy="0"/>
+        </a:xfrm>
+      </p:grpSpPr>
+      <p:sp>
+        <p:nvSpPr>
+          <p:cNvPr id="2" name="Title 1"/>
+          <p:cNvSpPr>
+            <a:spLocks noGrp="1"/>
+          </p:cNvSpPr>
+          <p:nvPr>
+            <p:ph type="title"/>
+          </p:nvPr>
+        </p:nvSpPr>
+        <p:spPr>
+          <a:xfrm>
+            <a:off x="457200" y="449932"/>
+            <a:ext cx="8286750" cy="1150353"/>
+          </a:xfrm>
+        </p:spPr>
+        <p:txBody>
+          <a:bodyPr/>
+          <a:lstStyle/>
+          <a:p>
+            <a:r>
+              <a:rPr lang="en-CA" dirty="0" smtClean="0">
+                <a:latin typeface="+mn-lt"/>
+              </a:rPr>
+              <a:t>Lab Notebook</a:t>
+            </a:r>
+            <a:endParaRPr lang="en-CA" dirty="0">
+              <a:latin typeface="+mn-lt"/>
+            </a:endParaRPr>
+          </a:p>
+        </p:txBody>
+      </p:sp>
+      <p:sp>
+        <p:nvSpPr>
+          <p:cNvPr id="3" name="Content Placeholder 2"/>
+          <p:cNvSpPr>
+            <a:spLocks noGrp="1"/>
+          </p:cNvSpPr>
+          <p:nvPr>
+            <p:ph idx="1"/>
+          </p:nvPr>
+        </p:nvSpPr>
+        <p:spPr>
+          <a:xfrm>
+            <a:off x="457200" y="1756947"/>
+            <a:ext cx="8286750" cy="3596103"/>
+          </a:xfrm>
+        </p:spPr>
+        <p:txBody>
+          <a:bodyPr/>
+          <a:lstStyle/>
+          <a:p>
+            <a:pPr marL="0" indent="0">
+              <a:buNone/>
+            </a:pPr>
+            <a:endParaRPr lang="en-CA" dirty="0" smtClean="0">
+              <a:latin typeface="Avenir LT Std 45 Book" pitchFamily="34" charset="0"/>
+            </a:endParaRPr>
+          </a:p>
+        </p:txBody>
+      </p:sp>
+    </p:spTree>
+    <p:extLst>
+      <p:ext uri="{BB962C8B-B14F-4D97-AF65-F5344CB8AC3E}">
+        <p14:creationId xmlns:p14="http://schemas.microsoft.com/office/powerpoint/2010/main" val="687167673"/>
       </p:ext>
     </p:extLst>
   </p:cSld>
@@ -7789,7 +7903,7 @@
         </p:spPr>
         <p:txBody>
           <a:bodyPr>
-            <a:normAutofit/>
+            <a:normAutofit lnSpcReduction="10000"/>
           </a:bodyPr>
           <a:lstStyle/>
           <a:p>
@@ -7800,7 +7914,7 @@
               <a:rPr lang="en-CA" dirty="0" smtClean="0">
                 <a:latin typeface="Avenir LT Std 45 Book" pitchFamily="34" charset="0"/>
               </a:rPr>
-              <a:t>I’m a senior from Toronto, Canada studying stats and applied math, and this is my seventh semester teaching at Cal. </a:t>
+              <a:t>I’m a senior from Toronto, Canada studying stats and applied math. This is my third semester on Data 8 staff and seventh semester teaching at Cal! </a:t>
             </a:r>
           </a:p>
           <a:p>
@@ -7837,16 +7951,10 @@
           </a:p>
           <a:p>
             <a:r>
-              <a:rPr lang="en-CA" b="1" smtClean="0">
-                <a:latin typeface="Avenir LT Std 45 Book" pitchFamily="34" charset="0"/>
-              </a:rPr>
-              <a:t>Lab Website</a:t>
-            </a:r>
-            <a:r>
               <a:rPr lang="en-CA" b="1" dirty="0" smtClean="0">
                 <a:latin typeface="Avenir LT Std 45 Book" pitchFamily="34" charset="0"/>
               </a:rPr>
-              <a:t>:</a:t>
+              <a:t>Lab Website:</a:t>
             </a:r>
             <a:r>
               <a:rPr lang="en-CA" dirty="0">
@@ -7859,44 +7967,31 @@
                 <a:latin typeface="Avenir LT Std 45 Book" pitchFamily="34" charset="0"/>
                 <a:hlinkClick r:id="rId3"/>
               </a:rPr>
-              <a:t>https</a:t>
-            </a:r>
-            <a:r>
-              <a:rPr lang="en-CA">
-                <a:latin typeface="Avenir LT Std 45 Book" pitchFamily="34" charset="0"/>
-                <a:hlinkClick r:id="rId3"/>
-              </a:rPr>
-              <a:t>://</a:t>
-            </a:r>
-            <a:r>
-              <a:rPr lang="en-CA" smtClean="0">
+              <a:t>https://</a:t>
+            </a:r>
+            <a:r>
+              <a:rPr lang="en-CA" dirty="0" smtClean="0">
                 <a:latin typeface="Avenir LT Std 45 Book" pitchFamily="34" charset="0"/>
                 <a:hlinkClick r:id="rId3"/>
               </a:rPr>
               <a:t>hluo27.github.io/data8</a:t>
             </a:r>
-            <a:endParaRPr lang="en-CA" smtClean="0">
+            <a:endParaRPr lang="en-CA" dirty="0" smtClean="0">
               <a:latin typeface="Avenir LT Std 45 Book" pitchFamily="34" charset="0"/>
             </a:endParaRPr>
           </a:p>
           <a:p>
-            <a:r>
-              <a:rPr lang="en-CA" b="1" smtClean="0">
-                <a:latin typeface="Avenir LT Std 45 Book" pitchFamily="34" charset="0"/>
-              </a:rPr>
-              <a:t>Lab</a:t>
-            </a:r>
             <a:r>
               <a:rPr lang="en-CA" b="1" dirty="0" smtClean="0">
                 <a:latin typeface="Avenir LT Std 45 Book" pitchFamily="34" charset="0"/>
               </a:rPr>
-              <a:t>:</a:t>
+              <a:t>Lab:</a:t>
             </a:r>
             <a:r>
               <a:rPr lang="en-CA" dirty="0" smtClean="0">
                 <a:latin typeface="Avenir LT Std 45 Book" pitchFamily="34" charset="0"/>
               </a:rPr>
-              <a:t> TBD</a:t>
+              <a:t> Friday 9-11am in Evans B6</a:t>
             </a:r>
           </a:p>
           <a:p>
@@ -7910,7 +8005,7 @@
               <a:rPr lang="en-CA" dirty="0" smtClean="0">
                 <a:latin typeface="Avenir LT Std 45 Book" pitchFamily="34" charset="0"/>
               </a:rPr>
-              <a:t>TBD</a:t>
+              <a:t>Friday 2-3pm</a:t>
             </a:r>
           </a:p>
         </p:txBody>
@@ -8031,25 +8126,141 @@
         <p:spPr>
           <a:xfrm>
             <a:off x="457200" y="1756947"/>
-            <a:ext cx="8286750" cy="3596103"/>
+            <a:ext cx="8286750" cy="4100928"/>
           </a:xfrm>
         </p:spPr>
         <p:txBody>
-          <a:bodyPr/>
+          <a:bodyPr>
+            <a:normAutofit/>
+          </a:bodyPr>
           <a:lstStyle/>
           <a:p>
-            <a:pPr marL="0" indent="0">
+            <a:r>
+              <a:rPr lang="en-CA" sz="2000" dirty="0" smtClean="0">
+                <a:latin typeface="+mn-lt"/>
+              </a:rPr>
+              <a:t>Students can only attend the lab they are enrolled in</a:t>
+            </a:r>
+          </a:p>
+          <a:p>
+            <a:r>
+              <a:rPr lang="en-CA" sz="2000" dirty="0" smtClean="0">
+                <a:latin typeface="+mn-lt"/>
+              </a:rPr>
+              <a:t>Lab assignments released on Monday. Two ways to get credit:</a:t>
+            </a:r>
+          </a:p>
+          <a:p>
+            <a:pPr marL="457200" lvl="1" indent="0">
               <a:buNone/>
             </a:pPr>
             <a:r>
               <a:rPr lang="en-CA" dirty="0" smtClean="0">
-                <a:latin typeface="Avenir LT Std 45 Book" pitchFamily="34" charset="0"/>
+                <a:latin typeface="+mn-lt"/>
               </a:rPr>
-              <a:t>TBD</a:t>
-            </a:r>
-            <a:endParaRPr lang="en-CA" dirty="0">
-              <a:latin typeface="Avenir LT Std 45 Book" pitchFamily="34" charset="0"/>
-            </a:endParaRPr>
+              <a:t>1. Attend lab </a:t>
+            </a:r>
+            <a:r>
+              <a:rPr lang="en-CA" b="1" dirty="0" smtClean="0">
+                <a:latin typeface="+mn-lt"/>
+              </a:rPr>
+              <a:t>and</a:t>
+            </a:r>
+            <a:r>
+              <a:rPr lang="en-CA" dirty="0" smtClean="0">
+                <a:latin typeface="+mn-lt"/>
+              </a:rPr>
+              <a:t> discussion section; make substantial progress</a:t>
+            </a:r>
+          </a:p>
+          <a:p>
+            <a:pPr marL="457200" lvl="1" indent="0">
+              <a:buNone/>
+            </a:pPr>
+            <a:r>
+              <a:rPr lang="en-CA" dirty="0" smtClean="0">
+                <a:latin typeface="+mn-lt"/>
+              </a:rPr>
+              <a:t>2. Finish and pass all </a:t>
+            </a:r>
+            <a:r>
+              <a:rPr lang="en-CA" dirty="0" err="1" smtClean="0">
+                <a:latin typeface="+mn-lt"/>
+              </a:rPr>
+              <a:t>autograder</a:t>
+            </a:r>
+            <a:r>
+              <a:rPr lang="en-CA" dirty="0" smtClean="0">
+                <a:latin typeface="+mn-lt"/>
+              </a:rPr>
+              <a:t> tests by Wednesday at 8:59 AM</a:t>
+            </a:r>
+          </a:p>
+          <a:p>
+            <a:r>
+              <a:rPr lang="en-CA" sz="2000" dirty="0" smtClean="0">
+                <a:latin typeface="+mn-lt"/>
+              </a:rPr>
+              <a:t>Waitlisted Students</a:t>
+            </a:r>
+          </a:p>
+          <a:p>
+            <a:pPr lvl="1"/>
+            <a:r>
+              <a:rPr lang="en-CA" dirty="0" smtClean="0">
+                <a:latin typeface="+mn-lt"/>
+              </a:rPr>
+              <a:t>Enrolled once there is an open seat in lecture + lab section</a:t>
+            </a:r>
+          </a:p>
+          <a:p>
+            <a:pPr lvl="1"/>
+            <a:r>
+              <a:rPr lang="en-CA" dirty="0" smtClean="0">
+                <a:latin typeface="+mn-lt"/>
+              </a:rPr>
+              <a:t>GSIs do not know what position students are at on the waitlist and cannot manually switch students (must be done by student on </a:t>
+            </a:r>
+            <a:r>
+              <a:rPr lang="en-CA" dirty="0" err="1" smtClean="0">
+                <a:latin typeface="+mn-lt"/>
+              </a:rPr>
+              <a:t>CalCentral</a:t>
+            </a:r>
+            <a:r>
+              <a:rPr lang="en-CA" dirty="0" smtClean="0">
+                <a:latin typeface="+mn-lt"/>
+              </a:rPr>
+              <a:t>)</a:t>
+            </a:r>
+          </a:p>
+          <a:p>
+            <a:r>
+              <a:rPr lang="en-CA" sz="2000" dirty="0" smtClean="0">
+                <a:latin typeface="+mn-lt"/>
+              </a:rPr>
+              <a:t>See </a:t>
+            </a:r>
+            <a:r>
+              <a:rPr lang="en-CA" sz="2000" dirty="0">
+                <a:latin typeface="+mn-lt"/>
+                <a:hlinkClick r:id="rId2"/>
+              </a:rPr>
+              <a:t>http://</a:t>
+            </a:r>
+            <a:r>
+              <a:rPr lang="en-CA" sz="2000" dirty="0" smtClean="0">
+                <a:latin typeface="+mn-lt"/>
+                <a:hlinkClick r:id="rId2"/>
+              </a:rPr>
+              <a:t>data8.org/fa19/policies.html</a:t>
+            </a:r>
+            <a:r>
+              <a:rPr lang="en-CA" sz="2000" dirty="0" smtClean="0">
+                <a:latin typeface="+mn-lt"/>
+              </a:rPr>
+              <a:t> for more details (screenshot on next slide)</a:t>
+            </a:r>
           </a:p>
         </p:txBody>
       </p:sp>
@@ -8090,6 +8301,68 @@
           <a:chExt cx="0" cy="0"/>
         </a:xfrm>
       </p:grpSpPr>
+      <p:pic>
+        <p:nvPicPr>
+          <p:cNvPr id="4" name="Picture 3"/>
+          <p:cNvPicPr>
+            <a:picLocks noChangeAspect="1" noChangeArrowheads="1"/>
+          </p:cNvPicPr>
+          <p:nvPr/>
+        </p:nvPicPr>
+        <p:blipFill rotWithShape="1">
+          <a:blip r:embed="rId2">
+            <a:extLst>
+              <a:ext uri="{28A0092B-C50C-407E-A947-70E740481C1C}">
+                <a14:useLocalDpi xmlns:a14="http://schemas.microsoft.com/office/drawing/2010/main" val="0"/>
+              </a:ext>
+            </a:extLst>
+          </a:blip>
+          <a:srcRect t="7851"/>
+          <a:stretch/>
+        </p:blipFill>
+        <p:spPr bwMode="auto">
+          <a:xfrm>
+            <a:off x="869519" y="1419225"/>
+            <a:ext cx="7404962" cy="4400550"/>
+          </a:xfrm>
+          <a:prstGeom prst="rect">
+            <a:avLst/>
+          </a:prstGeom>
+          <a:noFill/>
+          <a:ln>
+            <a:noFill/>
+          </a:ln>
+          <a:effectLst/>
+          <a:extLst>
+            <a:ext uri="{909E8E84-426E-40DD-AFC4-6F175D3DCCD1}">
+              <a14:hiddenFill xmlns:a14="http://schemas.microsoft.com/office/drawing/2010/main">
+                <a:solidFill>
+                  <a:schemeClr val="accent1"/>
+                </a:solidFill>
+              </a14:hiddenFill>
+            </a:ext>
+            <a:ext uri="{91240B29-F687-4F45-9708-019B960494DF}">
+              <a14:hiddenLine xmlns:a14="http://schemas.microsoft.com/office/drawing/2010/main" w="9525">
+                <a:solidFill>
+                  <a:schemeClr val="tx1"/>
+                </a:solidFill>
+                <a:miter lim="800000"/>
+                <a:headEnd/>
+                <a:tailEnd/>
+              </a14:hiddenLine>
+            </a:ext>
+            <a:ext uri="{AF507438-7753-43E0-B8FC-AC1667EBCBE1}">
+              <a14:hiddenEffects xmlns:a14="http://schemas.microsoft.com/office/drawing/2010/main">
+                <a:effectLst>
+                  <a:outerShdw dist="35921" dir="2700000" algn="ctr" rotWithShape="0">
+                    <a:schemeClr val="bg2"/>
+                  </a:outerShdw>
+                </a:effectLst>
+              </a14:hiddenEffects>
+            </a:ext>
+          </a:extLst>
+        </p:spPr>
+      </p:pic>
       <p:sp>
         <p:nvSpPr>
           <p:cNvPr id="2" name="Title 1"/>
@@ -8114,74 +8387,10 @@
               <a:rPr lang="en-CA" dirty="0" smtClean="0">
                 <a:latin typeface="+mn-lt"/>
               </a:rPr>
-              <a:t>Introductions</a:t>
+              <a:t>Lab Policies (Detailed)</a:t>
             </a:r>
             <a:endParaRPr lang="en-CA" dirty="0">
               <a:latin typeface="+mn-lt"/>
-            </a:endParaRPr>
-          </a:p>
-        </p:txBody>
-      </p:sp>
-      <p:sp>
-        <p:nvSpPr>
-          <p:cNvPr id="3" name="Content Placeholder 2"/>
-          <p:cNvSpPr>
-            <a:spLocks noGrp="1"/>
-          </p:cNvSpPr>
-          <p:nvPr>
-            <p:ph idx="1"/>
-          </p:nvPr>
-        </p:nvSpPr>
-        <p:spPr>
-          <a:xfrm>
-            <a:off x="457200" y="1756947"/>
-            <a:ext cx="8286750" cy="3596103"/>
-          </a:xfrm>
-        </p:spPr>
-        <p:txBody>
-          <a:bodyPr/>
-          <a:lstStyle/>
-          <a:p>
-            <a:r>
-              <a:rPr lang="en-CA" dirty="0" smtClean="0">
-                <a:latin typeface="Avenir LT Std 45 Book" pitchFamily="34" charset="0"/>
-              </a:rPr>
-              <a:t>Name</a:t>
-            </a:r>
-          </a:p>
-          <a:p>
-            <a:r>
-              <a:rPr lang="en-CA" dirty="0" smtClean="0">
-                <a:latin typeface="Avenir LT Std 45 Book" pitchFamily="34" charset="0"/>
-              </a:rPr>
-              <a:t>Year</a:t>
-            </a:r>
-          </a:p>
-          <a:p>
-            <a:r>
-              <a:rPr lang="en-CA" dirty="0" smtClean="0">
-                <a:latin typeface="Avenir LT Std 45 Book" pitchFamily="34" charset="0"/>
-              </a:rPr>
-              <a:t>Major</a:t>
-            </a:r>
-          </a:p>
-          <a:p>
-            <a:r>
-              <a:rPr lang="en-CA" dirty="0" smtClean="0">
-                <a:latin typeface="Avenir LT Std 45 Book" pitchFamily="34" charset="0"/>
-              </a:rPr>
-              <a:t>Hometown</a:t>
-            </a:r>
-          </a:p>
-          <a:p>
-            <a:r>
-              <a:rPr lang="en-CA" dirty="0" smtClean="0">
-                <a:latin typeface="Avenir LT Std 45 Book" pitchFamily="34" charset="0"/>
-              </a:rPr>
-              <a:t>A fun fact!</a:t>
-            </a:r>
-            <a:endParaRPr lang="en-CA" dirty="0">
-              <a:latin typeface="Avenir LT Std 45 Book" pitchFamily="34" charset="0"/>
             </a:endParaRPr>
           </a:p>
         </p:txBody>
@@ -8189,7 +8398,7 @@
     </p:spTree>
     <p:extLst>
       <p:ext uri="{BB962C8B-B14F-4D97-AF65-F5344CB8AC3E}">
-        <p14:creationId xmlns:p14="http://schemas.microsoft.com/office/powerpoint/2010/main" val="1544152936"/>
+        <p14:creationId xmlns:p14="http://schemas.microsoft.com/office/powerpoint/2010/main" val="2272188497"/>
       </p:ext>
     </p:extLst>
   </p:cSld>
@@ -8247,7 +8456,7 @@
               <a:rPr lang="en-CA" dirty="0" smtClean="0">
                 <a:latin typeface="+mn-lt"/>
               </a:rPr>
-              <a:t>Discussion Worksheet</a:t>
+              <a:t>Grading Logistics</a:t>
             </a:r>
             <a:endParaRPr lang="en-CA" dirty="0">
               <a:latin typeface="+mn-lt"/>
@@ -8268,29 +8477,60 @@
         <p:spPr>
           <a:xfrm>
             <a:off x="457200" y="1756947"/>
-            <a:ext cx="8286750" cy="3596103"/>
+            <a:ext cx="8286750" cy="4100928"/>
           </a:xfrm>
         </p:spPr>
         <p:txBody>
-          <a:bodyPr/>
+          <a:bodyPr>
+            <a:normAutofit/>
+          </a:bodyPr>
           <a:lstStyle/>
           <a:p>
             <a:r>
-              <a:rPr lang="en-CA" dirty="0" smtClean="0">
-                <a:latin typeface="Avenir LT Std 45 Book" pitchFamily="34" charset="0"/>
+              <a:rPr lang="en-CA" sz="2000" dirty="0" smtClean="0">
+                <a:latin typeface="+mn-lt"/>
               </a:rPr>
-              <a:t>Introduce yourself to the people sitting around you and work in teams!</a:t>
-            </a:r>
-            <a:endParaRPr lang="en-CA" dirty="0">
-              <a:latin typeface="Avenir LT Std 45 Book" pitchFamily="34" charset="0"/>
-            </a:endParaRPr>
+              <a:t>Each student should have Gradescope and Okpy accounts</a:t>
+            </a:r>
+          </a:p>
+          <a:p>
+            <a:r>
+              <a:rPr lang="en-CA" sz="2000" dirty="0" smtClean="0">
+                <a:latin typeface="+mn-lt"/>
+              </a:rPr>
+              <a:t>All labs, homework, and projects will be submitted to Okpy</a:t>
+            </a:r>
+          </a:p>
+          <a:p>
+            <a:r>
+              <a:rPr lang="en-CA" sz="2000" dirty="0" smtClean="0">
+                <a:latin typeface="+mn-lt"/>
+              </a:rPr>
+              <a:t>Code is auto-graded and marks posted on Okpy</a:t>
+            </a:r>
+          </a:p>
+          <a:p>
+            <a:r>
+              <a:rPr lang="en-CA" sz="2000" dirty="0" smtClean="0">
+                <a:latin typeface="+mn-lt"/>
+              </a:rPr>
+              <a:t>Written answers graded by course staff on Gradescope</a:t>
+            </a:r>
+          </a:p>
+          <a:p>
+            <a:r>
+              <a:rPr lang="en-CA" sz="2000" dirty="0" smtClean="0">
+                <a:latin typeface="+mn-lt"/>
+              </a:rPr>
+              <a:t>Let me know if you don’t yet have an account on either!</a:t>
+            </a:r>
           </a:p>
         </p:txBody>
       </p:sp>
     </p:spTree>
     <p:extLst>
       <p:ext uri="{BB962C8B-B14F-4D97-AF65-F5344CB8AC3E}">
-        <p14:creationId xmlns:p14="http://schemas.microsoft.com/office/powerpoint/2010/main" val="2990465893"/>
+        <p14:creationId xmlns:p14="http://schemas.microsoft.com/office/powerpoint/2010/main" val="1478262708"/>
       </p:ext>
     </p:extLst>
   </p:cSld>
@@ -8348,7 +8588,7 @@
               <a:rPr lang="en-CA" dirty="0" smtClean="0">
                 <a:latin typeface="+mn-lt"/>
               </a:rPr>
-              <a:t>Discussion: Solutions</a:t>
+              <a:t>Introductions</a:t>
             </a:r>
             <a:endParaRPr lang="en-CA" dirty="0">
               <a:latin typeface="+mn-lt"/>
@@ -8376,15 +8616,33 @@
           <a:bodyPr/>
           <a:lstStyle/>
           <a:p>
-            <a:pPr marL="457200" indent="-457200">
-              <a:buFont typeface="+mj-lt"/>
-              <a:buAutoNum type="arabicPeriod"/>
+            <a:pPr marL="0" indent="0">
+              <a:buNone/>
             </a:pPr>
             <a:r>
               <a:rPr lang="en-CA" dirty="0" smtClean="0">
                 <a:latin typeface="Avenir LT Std 45 Book" pitchFamily="34" charset="0"/>
               </a:rPr>
-              <a:t>TBD</a:t>
+              <a:t>Form groups of at least 4 and find the most obscure thing you have in common.</a:t>
+            </a:r>
+          </a:p>
+          <a:p>
+            <a:pPr marL="0" indent="0">
+              <a:buNone/>
+            </a:pPr>
+            <a:endParaRPr lang="en-CA" dirty="0">
+              <a:latin typeface="Avenir LT Std 45 Book" pitchFamily="34" charset="0"/>
+            </a:endParaRPr>
+          </a:p>
+          <a:p>
+            <a:pPr marL="0" indent="0">
+              <a:buNone/>
+            </a:pPr>
+            <a:r>
+              <a:rPr lang="en-CA" dirty="0" smtClean="0">
+                <a:latin typeface="Avenir LT Std 45 Book" pitchFamily="34" charset="0"/>
+              </a:rPr>
+              <a:t>Example: During a previous semester, a group of 5 all had a sister with the same name!</a:t>
             </a:r>
             <a:endParaRPr lang="en-CA" dirty="0">
               <a:latin typeface="Avenir LT Std 45 Book" pitchFamily="34" charset="0"/>
@@ -8395,7 +8653,7 @@
     </p:spTree>
     <p:extLst>
       <p:ext uri="{BB962C8B-B14F-4D97-AF65-F5344CB8AC3E}">
-        <p14:creationId xmlns:p14="http://schemas.microsoft.com/office/powerpoint/2010/main" val="2639043306"/>
+        <p14:creationId xmlns:p14="http://schemas.microsoft.com/office/powerpoint/2010/main" val="1544152936"/>
       </p:ext>
     </p:extLst>
   </p:cSld>
@@ -8453,7 +8711,7 @@
               <a:rPr lang="en-CA" dirty="0" smtClean="0">
                 <a:latin typeface="+mn-lt"/>
               </a:rPr>
-              <a:t>Discussion: Recap</a:t>
+              <a:t>Discussion Worksheet</a:t>
             </a:r>
             <a:endParaRPr lang="en-CA" dirty="0">
               <a:latin typeface="+mn-lt"/>
@@ -8485,7 +8743,7 @@
               <a:rPr lang="en-CA" dirty="0" smtClean="0">
                 <a:latin typeface="Avenir LT Std 45 Book" pitchFamily="34" charset="0"/>
               </a:rPr>
-              <a:t>How did your team do?</a:t>
+              <a:t>Introduce yourself to the people sitting around you and work in pairs</a:t>
             </a:r>
           </a:p>
           <a:p>
@@ -8493,8 +8751,10 @@
               <a:rPr lang="en-CA" dirty="0" smtClean="0">
                 <a:latin typeface="Avenir LT Std 45 Book" pitchFamily="34" charset="0"/>
               </a:rPr>
-              <a:t>How did your group come up with an estimated number?</a:t>
-            </a:r>
+              <a:t>Don’t use online resources!</a:t>
+            </a:r>
+          </a:p>
+          <a:p>
             <a:endParaRPr lang="en-CA" dirty="0">
               <a:latin typeface="Avenir LT Std 45 Book" pitchFamily="34" charset="0"/>
             </a:endParaRPr>
@@ -8504,7 +8764,7 @@
     </p:spTree>
     <p:extLst>
       <p:ext uri="{BB962C8B-B14F-4D97-AF65-F5344CB8AC3E}">
-        <p14:creationId xmlns:p14="http://schemas.microsoft.com/office/powerpoint/2010/main" val="3855627821"/>
+        <p14:creationId xmlns:p14="http://schemas.microsoft.com/office/powerpoint/2010/main" val="2990465893"/>
       </p:ext>
     </p:extLst>
   </p:cSld>
@@ -8562,7 +8822,7 @@
               <a:rPr lang="en-CA" dirty="0" smtClean="0">
                 <a:latin typeface="+mn-lt"/>
               </a:rPr>
-              <a:t>Class Survey</a:t>
+              <a:t>Discussion: Solutions</a:t>
             </a:r>
             <a:endParaRPr lang="en-CA" dirty="0">
               <a:latin typeface="+mn-lt"/>
@@ -8590,41 +8850,69 @@
           <a:bodyPr/>
           <a:lstStyle/>
           <a:p>
-            <a:pPr marL="0" indent="0">
-              <a:buNone/>
+            <a:pPr marL="457200" indent="-457200">
+              <a:buFont typeface="+mj-lt"/>
+              <a:buAutoNum type="arabicPeriod"/>
             </a:pPr>
             <a:r>
               <a:rPr lang="en-CA" dirty="0" smtClean="0">
                 <a:latin typeface="Avenir LT Std 45 Book" pitchFamily="34" charset="0"/>
               </a:rPr>
-              <a:t>Please fill out this form before starting the lab notebook:</a:t>
-            </a:r>
-          </a:p>
-          <a:p>
-            <a:pPr marL="0" indent="0">
-              <a:buNone/>
+              <a:t>50</a:t>
+            </a:r>
+          </a:p>
+          <a:p>
+            <a:pPr marL="457200" indent="-457200">
+              <a:buFont typeface="+mj-lt"/>
+              <a:buAutoNum type="arabicPeriod"/>
             </a:pPr>
-            <a:endParaRPr lang="en-CA" dirty="0">
-              <a:latin typeface="Avenir LT Std 45 Book" pitchFamily="34" charset="0"/>
-            </a:endParaRPr>
-          </a:p>
-          <a:p>
-            <a:pPr marL="0" indent="0" algn="ctr">
-              <a:buNone/>
-            </a:pPr>
-            <a:r>
-              <a:rPr lang="en-CA" b="1" dirty="0" smtClean="0">
+            <a:r>
+              <a:rPr lang="en-CA" dirty="0" smtClean="0">
                 <a:latin typeface="Avenir LT Std 45 Book" pitchFamily="34" charset="0"/>
               </a:rPr>
-              <a:t>TBD</a:t>
-            </a:r>
-            <a:endParaRPr lang="en-CA" dirty="0" smtClean="0">
-              <a:latin typeface="Avenir LT Std 45 Book" pitchFamily="34" charset="0"/>
-            </a:endParaRPr>
-          </a:p>
-          <a:p>
-            <a:pPr marL="0" indent="0">
-              <a:buNone/>
+              <a:t>Cog </a:t>
+            </a:r>
+            <a:r>
+              <a:rPr lang="en-CA" dirty="0" err="1" smtClean="0">
+                <a:latin typeface="Avenir LT Std 45 Book" pitchFamily="34" charset="0"/>
+              </a:rPr>
+              <a:t>Sci</a:t>
+            </a:r>
+            <a:r>
+              <a:rPr lang="en-CA" dirty="0" smtClean="0">
+                <a:latin typeface="Avenir LT Std 45 Book" pitchFamily="34" charset="0"/>
+              </a:rPr>
+              <a:t>, English, Media Studies, Sociology, and Psychology</a:t>
+            </a:r>
+          </a:p>
+          <a:p>
+            <a:pPr marL="457200" indent="-457200">
+              <a:buFont typeface="+mj-lt"/>
+              <a:buAutoNum type="arabicPeriod"/>
+            </a:pPr>
+            <a:r>
+              <a:rPr lang="en-CA" dirty="0" smtClean="0">
+                <a:latin typeface="Avenir LT Std 45 Book" pitchFamily="34" charset="0"/>
+              </a:rPr>
+              <a:t>Hawaii and California</a:t>
+            </a:r>
+          </a:p>
+          <a:p>
+            <a:pPr marL="457200" indent="-457200">
+              <a:buFont typeface="+mj-lt"/>
+              <a:buAutoNum type="arabicPeriod"/>
+            </a:pPr>
+            <a:r>
+              <a:rPr lang="en-CA" dirty="0" smtClean="0">
+                <a:latin typeface="Avenir LT Std 45 Book" pitchFamily="34" charset="0"/>
+              </a:rPr>
+              <a:t>America: 78, World: 72</a:t>
+            </a:r>
+          </a:p>
+          <a:p>
+            <a:pPr marL="457200" indent="-457200">
+              <a:buFont typeface="+mj-lt"/>
+              <a:buAutoNum type="arabicPeriod"/>
             </a:pPr>
             <a:endParaRPr lang="en-CA" dirty="0">
               <a:latin typeface="Avenir LT Std 45 Book" pitchFamily="34" charset="0"/>
@@ -8635,7 +8923,7 @@
     </p:spTree>
     <p:extLst>
       <p:ext uri="{BB962C8B-B14F-4D97-AF65-F5344CB8AC3E}">
-        <p14:creationId xmlns:p14="http://schemas.microsoft.com/office/powerpoint/2010/main" val="2377332781"/>
+        <p14:creationId xmlns:p14="http://schemas.microsoft.com/office/powerpoint/2010/main" val="2639043306"/>
       </p:ext>
     </p:extLst>
   </p:cSld>
@@ -8645,7 +8933,226 @@
   <p:timing>
     <p:tnLst>
       <p:par>
-        <p:cTn id="1" dur="indefinite" restart="never" nodeType="tmRoot"/>
+        <p:cTn id="1" dur="indefinite" restart="never" nodeType="tmRoot">
+          <p:childTnLst>
+            <p:seq concurrent="1" nextAc="seek">
+              <p:cTn id="2" dur="indefinite" nodeType="mainSeq">
+                <p:childTnLst>
+                  <p:par>
+                    <p:cTn id="3" fill="hold">
+                      <p:stCondLst>
+                        <p:cond delay="indefinite"/>
+                      </p:stCondLst>
+                      <p:childTnLst>
+                        <p:par>
+                          <p:cTn id="4" fill="hold">
+                            <p:stCondLst>
+                              <p:cond delay="0"/>
+                            </p:stCondLst>
+                            <p:childTnLst>
+                              <p:par>
+                                <p:cTn id="5" presetID="1" presetClass="entr" presetSubtype="0" fill="hold" nodeType="clickEffect">
+                                  <p:stCondLst>
+                                    <p:cond delay="0"/>
+                                  </p:stCondLst>
+                                  <p:childTnLst>
+                                    <p:set>
+                                      <p:cBhvr>
+                                        <p:cTn id="6" dur="1" fill="hold">
+                                          <p:stCondLst>
+                                            <p:cond delay="0"/>
+                                          </p:stCondLst>
+                                        </p:cTn>
+                                        <p:tgtEl>
+                                          <p:spTgt spid="3">
+                                            <p:txEl>
+                                              <p:pRg st="0" end="0"/>
+                                            </p:txEl>
+                                          </p:spTgt>
+                                        </p:tgtEl>
+                                        <p:attrNameLst>
+                                          <p:attrName>style.visibility</p:attrName>
+                                        </p:attrNameLst>
+                                      </p:cBhvr>
+                                      <p:to>
+                                        <p:strVal val="visible"/>
+                                      </p:to>
+                                    </p:set>
+                                  </p:childTnLst>
+                                </p:cTn>
+                              </p:par>
+                            </p:childTnLst>
+                          </p:cTn>
+                        </p:par>
+                      </p:childTnLst>
+                    </p:cTn>
+                  </p:par>
+                  <p:par>
+                    <p:cTn id="7" fill="hold">
+                      <p:stCondLst>
+                        <p:cond delay="indefinite"/>
+                      </p:stCondLst>
+                      <p:childTnLst>
+                        <p:par>
+                          <p:cTn id="8" fill="hold">
+                            <p:stCondLst>
+                              <p:cond delay="0"/>
+                            </p:stCondLst>
+                            <p:childTnLst>
+                              <p:par>
+                                <p:cTn id="9" presetID="1" presetClass="entr" presetSubtype="0" fill="hold" nodeType="clickEffect">
+                                  <p:stCondLst>
+                                    <p:cond delay="0"/>
+                                  </p:stCondLst>
+                                  <p:childTnLst>
+                                    <p:set>
+                                      <p:cBhvr>
+                                        <p:cTn id="10" dur="1" fill="hold">
+                                          <p:stCondLst>
+                                            <p:cond delay="0"/>
+                                          </p:stCondLst>
+                                        </p:cTn>
+                                        <p:tgtEl>
+                                          <p:spTgt spid="3">
+                                            <p:txEl>
+                                              <p:pRg st="1" end="1"/>
+                                            </p:txEl>
+                                          </p:spTgt>
+                                        </p:tgtEl>
+                                        <p:attrNameLst>
+                                          <p:attrName>style.visibility</p:attrName>
+                                        </p:attrNameLst>
+                                      </p:cBhvr>
+                                      <p:to>
+                                        <p:strVal val="visible"/>
+                                      </p:to>
+                                    </p:set>
+                                  </p:childTnLst>
+                                </p:cTn>
+                              </p:par>
+                            </p:childTnLst>
+                          </p:cTn>
+                        </p:par>
+                      </p:childTnLst>
+                    </p:cTn>
+                  </p:par>
+                  <p:par>
+                    <p:cTn id="11" fill="hold">
+                      <p:stCondLst>
+                        <p:cond delay="indefinite"/>
+                      </p:stCondLst>
+                      <p:childTnLst>
+                        <p:par>
+                          <p:cTn id="12" fill="hold">
+                            <p:stCondLst>
+                              <p:cond delay="0"/>
+                            </p:stCondLst>
+                            <p:childTnLst>
+                              <p:par>
+                                <p:cTn id="13" presetID="1" presetClass="entr" presetSubtype="0" fill="hold" nodeType="clickEffect">
+                                  <p:stCondLst>
+                                    <p:cond delay="0"/>
+                                  </p:stCondLst>
+                                  <p:childTnLst>
+                                    <p:set>
+                                      <p:cBhvr>
+                                        <p:cTn id="14" dur="1" fill="hold">
+                                          <p:stCondLst>
+                                            <p:cond delay="0"/>
+                                          </p:stCondLst>
+                                        </p:cTn>
+                                        <p:tgtEl>
+                                          <p:spTgt spid="3">
+                                            <p:txEl>
+                                              <p:pRg st="2" end="2"/>
+                                            </p:txEl>
+                                          </p:spTgt>
+                                        </p:tgtEl>
+                                        <p:attrNameLst>
+                                          <p:attrName>style.visibility</p:attrName>
+                                        </p:attrNameLst>
+                                      </p:cBhvr>
+                                      <p:to>
+                                        <p:strVal val="visible"/>
+                                      </p:to>
+                                    </p:set>
+                                  </p:childTnLst>
+                                </p:cTn>
+                              </p:par>
+                            </p:childTnLst>
+                          </p:cTn>
+                        </p:par>
+                      </p:childTnLst>
+                    </p:cTn>
+                  </p:par>
+                  <p:par>
+                    <p:cTn id="15" fill="hold">
+                      <p:stCondLst>
+                        <p:cond delay="indefinite"/>
+                      </p:stCondLst>
+                      <p:childTnLst>
+                        <p:par>
+                          <p:cTn id="16" fill="hold">
+                            <p:stCondLst>
+                              <p:cond delay="0"/>
+                            </p:stCondLst>
+                            <p:childTnLst>
+                              <p:par>
+                                <p:cTn id="17" presetID="1" presetClass="entr" presetSubtype="0" fill="hold" nodeType="clickEffect">
+                                  <p:stCondLst>
+                                    <p:cond delay="0"/>
+                                  </p:stCondLst>
+                                  <p:childTnLst>
+                                    <p:set>
+                                      <p:cBhvr>
+                                        <p:cTn id="18" dur="1" fill="hold">
+                                          <p:stCondLst>
+                                            <p:cond delay="0"/>
+                                          </p:stCondLst>
+                                        </p:cTn>
+                                        <p:tgtEl>
+                                          <p:spTgt spid="3">
+                                            <p:txEl>
+                                              <p:pRg st="3" end="3"/>
+                                            </p:txEl>
+                                          </p:spTgt>
+                                        </p:tgtEl>
+                                        <p:attrNameLst>
+                                          <p:attrName>style.visibility</p:attrName>
+                                        </p:attrNameLst>
+                                      </p:cBhvr>
+                                      <p:to>
+                                        <p:strVal val="visible"/>
+                                      </p:to>
+                                    </p:set>
+                                  </p:childTnLst>
+                                </p:cTn>
+                              </p:par>
+                            </p:childTnLst>
+                          </p:cTn>
+                        </p:par>
+                      </p:childTnLst>
+                    </p:cTn>
+                  </p:par>
+                </p:childTnLst>
+              </p:cTn>
+              <p:prevCondLst>
+                <p:cond evt="onPrev" delay="0">
+                  <p:tgtEl>
+                    <p:sldTgt/>
+                  </p:tgtEl>
+                </p:cond>
+              </p:prevCondLst>
+              <p:nextCondLst>
+                <p:cond evt="onNext" delay="0">
+                  <p:tgtEl>
+                    <p:sldTgt/>
+                  </p:tgtEl>
+                </p:cond>
+              </p:nextCondLst>
+            </p:seq>
+          </p:childTnLst>
+        </p:cTn>
       </p:par>
     </p:tnLst>
   </p:timing>
@@ -8693,7 +9200,7 @@
               <a:rPr lang="en-CA" dirty="0" smtClean="0">
                 <a:latin typeface="+mn-lt"/>
               </a:rPr>
-              <a:t>Lab Notebook</a:t>
+              <a:t>Class Survey</a:t>
             </a:r>
             <a:endParaRPr lang="en-CA" dirty="0">
               <a:latin typeface="+mn-lt"/>
@@ -8725,18 +9232,49 @@
               <a:buNone/>
             </a:pPr>
             <a:r>
-              <a:rPr lang="en-CA" smtClean="0">
-                <a:latin typeface="Avenir LT Std 45 Book" pitchFamily="34" charset="0"/>
+              <a:rPr lang="en-CA" dirty="0" smtClean="0">
+                <a:latin typeface="+mn-lt"/>
               </a:rPr>
-              <a:t>TBD</a:t>
-            </a:r>
+              <a:t>Please fill out this form before starting the lab notebook:</a:t>
+            </a:r>
+          </a:p>
+          <a:p>
+            <a:pPr marL="0" indent="0">
+              <a:buNone/>
+            </a:pPr>
+            <a:endParaRPr lang="en-CA" dirty="0">
+              <a:latin typeface="+mn-lt"/>
+            </a:endParaRPr>
+          </a:p>
+          <a:p>
+            <a:pPr marL="0" indent="0" algn="ctr">
+              <a:buNone/>
+            </a:pPr>
+            <a:r>
+              <a:rPr lang="en-CA" dirty="0">
+                <a:latin typeface="+mn-lt"/>
+                <a:hlinkClick r:id="rId2"/>
+              </a:rPr>
+              <a:t>http://tinyurl.com/data8-hubert</a:t>
+            </a:r>
+            <a:endParaRPr lang="en-CA" dirty="0" smtClean="0">
+              <a:latin typeface="+mn-lt"/>
+            </a:endParaRPr>
+          </a:p>
+          <a:p>
+            <a:pPr marL="0" indent="0">
+              <a:buNone/>
+            </a:pPr>
+            <a:endParaRPr lang="en-CA" dirty="0">
+              <a:latin typeface="+mn-lt"/>
+            </a:endParaRPr>
           </a:p>
         </p:txBody>
       </p:sp>
     </p:spTree>
     <p:extLst>
       <p:ext uri="{BB962C8B-B14F-4D97-AF65-F5344CB8AC3E}">
-        <p14:creationId xmlns:p14="http://schemas.microsoft.com/office/powerpoint/2010/main" val="687167673"/>
+        <p14:creationId xmlns:p14="http://schemas.microsoft.com/office/powerpoint/2010/main" val="2377332781"/>
       </p:ext>
     </p:extLst>
   </p:cSld>

</xml_diff>